<commit_message>
mindre endring i presentasjon
</commit_message>
<xml_diff>
--- a/Kursmateriell/presentasjoner/NTNU-Abakus-kurs.pptx
+++ b/Kursmateriell/presentasjoner/NTNU-Abakus-kurs.pptx
@@ -5,7 +5,7 @@
     <p:sldMasterId id="2147483660" r:id="rId1"/>
   </p:sldMasterIdLst>
   <p:notesMasterIdLst>
-    <p:notesMasterId r:id="rId19"/>
+    <p:notesMasterId r:id="rId21"/>
   </p:notesMasterIdLst>
   <p:sldIdLst>
     <p:sldId id="256" r:id="rId2"/>
@@ -25,6 +25,8 @@
     <p:sldId id="292" r:id="rId16"/>
     <p:sldId id="293" r:id="rId17"/>
     <p:sldId id="294" r:id="rId18"/>
+    <p:sldId id="301" r:id="rId19"/>
+    <p:sldId id="302" r:id="rId20"/>
   </p:sldIdLst>
   <p:sldSz cx="9144000" cy="6858000" type="screen4x3"/>
   <p:notesSz cx="6858000" cy="9144000"/>
@@ -224,7 +226,7 @@
           <a:p>
             <a:fld id="{2F3076B3-A1C7-42B7-BAE7-FC622E9E1FEE}" type="datetimeFigureOut">
               <a:rPr lang="nb-NO" smtClean="0"/>
-              <a:t>25.02.2014</a:t>
+              <a:t>27.02.2014</a:t>
             </a:fld>
             <a:endParaRPr lang="nb-NO"/>
           </a:p>
@@ -4424,6 +4426,40 @@
           </a:p>
         </p:txBody>
       </p:sp>
+      <p:pic>
+        <p:nvPicPr>
+          <p:cNvPr id="1026" name="Picture 2" descr="Norkart-sommer 2014"/>
+          <p:cNvPicPr>
+            <a:picLocks noChangeAspect="1" noChangeArrowheads="1"/>
+          </p:cNvPicPr>
+          <p:nvPr/>
+        </p:nvPicPr>
+        <p:blipFill>
+          <a:blip r:embed="rId2">
+            <a:extLst>
+              <a:ext uri="{28A0092B-C50C-407E-A947-70E740481C1C}">
+                <a14:useLocalDpi xmlns:a14="http://schemas.microsoft.com/office/drawing/2010/main" val="0"/>
+              </a:ext>
+            </a:extLst>
+          </a:blip>
+          <a:srcRect/>
+          <a:stretch>
+            <a:fillRect/>
+          </a:stretch>
+        </p:blipFill>
+        <p:spPr bwMode="auto">
+          <a:xfrm>
+            <a:off x="1387216" y="2109204"/>
+            <a:ext cx="1905000" cy="2333626"/>
+          </a:xfrm>
+          <a:prstGeom prst="rect">
+            <a:avLst/>
+          </a:prstGeom>
+          <a:solidFill>
+            <a:schemeClr val="bg1"/>
+          </a:solidFill>
+        </p:spPr>
+      </p:pic>
     </p:spTree>
     <p:extLst>
       <p:ext uri="{BB962C8B-B14F-4D97-AF65-F5344CB8AC3E}">
@@ -4614,11 +4650,7 @@
             </a:r>
             <a:r>
               <a:rPr lang="nb-NO" smtClean="0"/>
-              <a:t>av </a:t>
-            </a:r>
-            <a:r>
-              <a:rPr lang="nb-NO" smtClean="0"/>
-              <a:t>Leaflet.js (leafletjs.com)</a:t>
+              <a:t>av Leaflet.js (leafletjs.com)</a:t>
             </a:r>
             <a:endParaRPr lang="nb-NO" dirty="0" smtClean="0"/>
           </a:p>
@@ -5231,13 +5263,8 @@
             </a:pPr>
             <a:r>
               <a:rPr lang="nb-NO" smtClean="0"/>
-              <a:t>Test </a:t>
-            </a:r>
-            <a:r>
-              <a:rPr lang="nb-NO" smtClean="0"/>
-              <a:t>lokalt</a:t>
-            </a:r>
-            <a:endParaRPr lang="nb-NO" smtClean="0"/>
+              <a:t>Test lokalt</a:t>
+            </a:r>
           </a:p>
         </p:txBody>
       </p:sp>
@@ -5406,13 +5433,8 @@
             </a:pPr>
             <a:r>
               <a:rPr lang="nb-NO" smtClean="0"/>
-              <a:t>Binde «click»-event som endrer på et annet objekt og fjerner seg </a:t>
-            </a:r>
-            <a:r>
-              <a:rPr lang="nb-NO" smtClean="0"/>
-              <a:t>selv</a:t>
-            </a:r>
-            <a:endParaRPr lang="nb-NO" smtClean="0"/>
+              <a:t>Binde «click»-event som endrer på et annet objekt og fjerner seg selv</a:t>
+            </a:r>
           </a:p>
         </p:txBody>
       </p:sp>
@@ -5813,13 +5835,8 @@
             </a:pPr>
             <a:r>
               <a:rPr lang="nb-NO" smtClean="0"/>
-              <a:t>Eksperimenter med ulike </a:t>
-            </a:r>
-            <a:r>
-              <a:rPr lang="nb-NO" smtClean="0"/>
-              <a:t>parametere</a:t>
-            </a:r>
-            <a:endParaRPr lang="nb-NO" smtClean="0"/>
+              <a:t>Eksperimenter med ulike parametere</a:t>
+            </a:r>
           </a:p>
           <a:p>
             <a:pPr marL="628650" lvl="1" indent="-285750">
@@ -6026,6 +6043,296 @@
 </p:sld>
 </file>
 
+<file path=ppt/slides/slide18.xml><?xml version="1.0" encoding="utf-8"?>
+<p:sld xmlns:a="http://schemas.openxmlformats.org/drawingml/2006/main" xmlns:r="http://schemas.openxmlformats.org/officeDocument/2006/relationships" xmlns:p="http://schemas.openxmlformats.org/presentationml/2006/main">
+  <p:cSld>
+    <p:spTree>
+      <p:nvGrpSpPr>
+        <p:cNvPr id="1" name=""/>
+        <p:cNvGrpSpPr/>
+        <p:nvPr/>
+      </p:nvGrpSpPr>
+      <p:grpSpPr>
+        <a:xfrm>
+          <a:off x="0" y="0"/>
+          <a:ext cx="0" cy="0"/>
+          <a:chOff x="0" y="0"/>
+          <a:chExt cx="0" cy="0"/>
+        </a:xfrm>
+      </p:grpSpPr>
+      <p:sp>
+        <p:nvSpPr>
+          <p:cNvPr id="2" name="Tittel 1"/>
+          <p:cNvSpPr>
+            <a:spLocks noGrp="1"/>
+          </p:cNvSpPr>
+          <p:nvPr>
+            <p:ph type="title"/>
+          </p:nvPr>
+        </p:nvSpPr>
+        <p:spPr/>
+        <p:txBody>
+          <a:bodyPr/>
+          <a:lstStyle/>
+          <a:p>
+            <a:r>
+              <a:rPr lang="nb-NO" smtClean="0"/>
+              <a:t>Sommerjobber</a:t>
+            </a:r>
+            <a:br>
+              <a:rPr lang="nb-NO" smtClean="0"/>
+            </a:br>
+            <a:r>
+              <a:rPr lang="nb-NO" smtClean="0"/>
+              <a:t>Sandvika, Lillehammer, Trondheim</a:t>
+            </a:r>
+            <a:endParaRPr lang="nb-NO"/>
+          </a:p>
+        </p:txBody>
+      </p:sp>
+      <p:pic>
+        <p:nvPicPr>
+          <p:cNvPr id="4" name="Bilde 3"/>
+          <p:cNvPicPr>
+            <a:picLocks noChangeAspect="1"/>
+          </p:cNvPicPr>
+          <p:nvPr/>
+        </p:nvPicPr>
+        <p:blipFill>
+          <a:blip r:embed="rId2"/>
+          <a:stretch>
+            <a:fillRect/>
+          </a:stretch>
+        </p:blipFill>
+        <p:spPr>
+          <a:xfrm>
+            <a:off x="1269225" y="1417638"/>
+            <a:ext cx="6605549" cy="4856499"/>
+          </a:xfrm>
+          <a:prstGeom prst="rect">
+            <a:avLst/>
+          </a:prstGeom>
+        </p:spPr>
+      </p:pic>
+      <p:sp>
+        <p:nvSpPr>
+          <p:cNvPr id="3" name="Rektangel 2"/>
+          <p:cNvSpPr/>
+          <p:nvPr/>
+        </p:nvSpPr>
+        <p:spPr>
+          <a:xfrm>
+            <a:off x="3536301" y="5746398"/>
+            <a:ext cx="2071395" cy="369332"/>
+          </a:xfrm>
+          <a:prstGeom prst="rect">
+            <a:avLst/>
+          </a:prstGeom>
+        </p:spPr>
+        <p:txBody>
+          <a:bodyPr wrap="square">
+            <a:spAutoFit/>
+          </a:bodyPr>
+          <a:lstStyle/>
+          <a:p>
+            <a:r>
+              <a:rPr lang="nb-NO" smtClean="0">
+                <a:hlinkClick r:id="rId3"/>
+              </a:rPr>
+              <a:t>http://norkart.no</a:t>
+            </a:r>
+            <a:r>
+              <a:rPr lang="nb-NO" smtClean="0"/>
+              <a:t> </a:t>
+            </a:r>
+            <a:endParaRPr lang="nb-NO"/>
+          </a:p>
+        </p:txBody>
+      </p:sp>
+    </p:spTree>
+    <p:extLst>
+      <p:ext uri="{BB962C8B-B14F-4D97-AF65-F5344CB8AC3E}">
+        <p14:creationId xmlns:p14="http://schemas.microsoft.com/office/powerpoint/2010/main" val="1124017838"/>
+      </p:ext>
+    </p:extLst>
+  </p:cSld>
+  <p:clrMapOvr>
+    <a:masterClrMapping/>
+  </p:clrMapOvr>
+  <p:timing>
+    <p:tnLst>
+      <p:par>
+        <p:cTn id="1" dur="indefinite" restart="never" nodeType="tmRoot"/>
+      </p:par>
+    </p:tnLst>
+  </p:timing>
+</p:sld>
+</file>
+
+<file path=ppt/slides/slide19.xml><?xml version="1.0" encoding="utf-8"?>
+<p:sld xmlns:a="http://schemas.openxmlformats.org/drawingml/2006/main" xmlns:r="http://schemas.openxmlformats.org/officeDocument/2006/relationships" xmlns:p="http://schemas.openxmlformats.org/presentationml/2006/main">
+  <p:cSld>
+    <p:spTree>
+      <p:nvGrpSpPr>
+        <p:cNvPr id="1" name=""/>
+        <p:cNvGrpSpPr/>
+        <p:nvPr/>
+      </p:nvGrpSpPr>
+      <p:grpSpPr>
+        <a:xfrm>
+          <a:off x="0" y="0"/>
+          <a:ext cx="0" cy="0"/>
+          <a:chOff x="0" y="0"/>
+          <a:chExt cx="0" cy="0"/>
+        </a:xfrm>
+      </p:grpSpPr>
+      <p:sp>
+        <p:nvSpPr>
+          <p:cNvPr id="2" name="Tittel 1"/>
+          <p:cNvSpPr>
+            <a:spLocks noGrp="1"/>
+          </p:cNvSpPr>
+          <p:nvPr>
+            <p:ph type="ctrTitle"/>
+          </p:nvPr>
+        </p:nvSpPr>
+        <p:spPr/>
+        <p:txBody>
+          <a:bodyPr/>
+          <a:lstStyle/>
+          <a:p>
+            <a:r>
+              <a:rPr lang="nb-NO" smtClean="0"/>
+              <a:t>Kartteknologier på web</a:t>
+            </a:r>
+            <a:br>
+              <a:rPr lang="nb-NO" smtClean="0"/>
+            </a:br>
+            <a:r>
+              <a:rPr lang="nb-NO" smtClean="0"/>
+              <a:t>webatlas.js</a:t>
+            </a:r>
+            <a:endParaRPr lang="nb-NO"/>
+          </a:p>
+        </p:txBody>
+      </p:sp>
+      <p:sp>
+        <p:nvSpPr>
+          <p:cNvPr id="3" name="Undertittel 2"/>
+          <p:cNvSpPr>
+            <a:spLocks noGrp="1"/>
+          </p:cNvSpPr>
+          <p:nvPr>
+            <p:ph type="subTitle" idx="1"/>
+          </p:nvPr>
+        </p:nvSpPr>
+        <p:spPr>
+          <a:xfrm>
+            <a:off x="4809600" y="3524400"/>
+            <a:ext cx="3888000" cy="752400"/>
+          </a:xfrm>
+        </p:spPr>
+        <p:txBody>
+          <a:bodyPr>
+            <a:normAutofit fontScale="92500" lnSpcReduction="20000"/>
+          </a:bodyPr>
+          <a:lstStyle/>
+          <a:p>
+            <a:r>
+              <a:rPr lang="nb-NO" sz="1500"/>
+              <a:t>Robert </a:t>
+            </a:r>
+            <a:r>
+              <a:rPr lang="nb-NO" sz="1500" smtClean="0"/>
+              <a:t>Nordan </a:t>
+            </a:r>
+          </a:p>
+          <a:p>
+            <a:r>
+              <a:rPr lang="nb-NO" sz="1000" smtClean="0"/>
+              <a:t>(robert.nordan@norkart.no)</a:t>
+            </a:r>
+          </a:p>
+          <a:p>
+            <a:r>
+              <a:rPr lang="nb-NO" sz="1500" smtClean="0"/>
+              <a:t>Alexander </a:t>
+            </a:r>
+            <a:r>
+              <a:rPr lang="nb-NO" sz="1500"/>
+              <a:t>Salveson </a:t>
+            </a:r>
+            <a:r>
+              <a:rPr lang="nb-NO" sz="1500" smtClean="0"/>
+              <a:t>Nossum </a:t>
+            </a:r>
+          </a:p>
+          <a:p>
+            <a:r>
+              <a:rPr lang="nb-NO" sz="1000" smtClean="0"/>
+              <a:t>(alexander.nossum@norkart.no)</a:t>
+            </a:r>
+            <a:endParaRPr lang="nb-NO" sz="1000"/>
+          </a:p>
+          <a:p>
+            <a:endParaRPr lang="nb-NO" smtClean="0"/>
+          </a:p>
+        </p:txBody>
+      </p:sp>
+      <p:pic>
+        <p:nvPicPr>
+          <p:cNvPr id="1026" name="Picture 2" descr="Norkart-sommer 2014"/>
+          <p:cNvPicPr>
+            <a:picLocks noChangeAspect="1" noChangeArrowheads="1"/>
+          </p:cNvPicPr>
+          <p:nvPr/>
+        </p:nvPicPr>
+        <p:blipFill>
+          <a:blip r:embed="rId2">
+            <a:extLst>
+              <a:ext uri="{28A0092B-C50C-407E-A947-70E740481C1C}">
+                <a14:useLocalDpi xmlns:a14="http://schemas.microsoft.com/office/drawing/2010/main" val="0"/>
+              </a:ext>
+            </a:extLst>
+          </a:blip>
+          <a:srcRect/>
+          <a:stretch>
+            <a:fillRect/>
+          </a:stretch>
+        </p:blipFill>
+        <p:spPr bwMode="auto">
+          <a:xfrm>
+            <a:off x="1387216" y="2109204"/>
+            <a:ext cx="1905000" cy="2333626"/>
+          </a:xfrm>
+          <a:prstGeom prst="rect">
+            <a:avLst/>
+          </a:prstGeom>
+          <a:solidFill>
+            <a:schemeClr val="bg1"/>
+          </a:solidFill>
+        </p:spPr>
+      </p:pic>
+    </p:spTree>
+    <p:extLst>
+      <p:ext uri="{BB962C8B-B14F-4D97-AF65-F5344CB8AC3E}">
+        <p14:creationId xmlns:p14="http://schemas.microsoft.com/office/powerpoint/2010/main" val="3795223006"/>
+      </p:ext>
+    </p:extLst>
+  </p:cSld>
+  <p:clrMapOvr>
+    <a:masterClrMapping/>
+  </p:clrMapOvr>
+  <p:timing>
+    <p:tnLst>
+      <p:par>
+        <p:cTn id="1" dur="indefinite" restart="never" nodeType="tmRoot"/>
+      </p:par>
+    </p:tnLst>
+  </p:timing>
+</p:sld>
+</file>
+
 <file path=ppt/slides/slide2.xml><?xml version="1.0" encoding="utf-8"?>
 <p:sld xmlns:a="http://schemas.openxmlformats.org/drawingml/2006/main" xmlns:r="http://schemas.openxmlformats.org/officeDocument/2006/relationships" xmlns:p="http://schemas.openxmlformats.org/presentationml/2006/main">
   <p:cSld>
@@ -6068,13 +6375,7 @@
               <a:rPr lang="nb-NO">
                 <a:hlinkClick r:id="rId2"/>
               </a:rPr>
-              <a:t>http</a:t>
-            </a:r>
-            <a:r>
-              <a:rPr lang="nb-NO">
-                <a:hlinkClick r:id="rId2"/>
-              </a:rPr>
-              <a:t>://</a:t>
+              <a:t>http://</a:t>
             </a:r>
             <a:r>
               <a:rPr lang="nb-NO" smtClean="0">
@@ -7675,13 +7976,7 @@
               <a:rPr lang="nb-NO">
                 <a:hlinkClick r:id="rId6"/>
               </a:rPr>
-              <a:t>http://</a:t>
-            </a:r>
-            <a:r>
-              <a:rPr lang="nb-NO">
-                <a:hlinkClick r:id="rId6"/>
-              </a:rPr>
-              <a:t>www.geomatikk.ntnu.no</a:t>
+              <a:t>http://www.geomatikk.ntnu.no</a:t>
             </a:r>
             <a:r>
               <a:rPr lang="nb-NO" smtClean="0">
@@ -7722,13 +8017,7 @@
               <a:rPr lang="nb-NO">
                 <a:hlinkClick r:id="rId7"/>
               </a:rPr>
-              <a:t>http://</a:t>
-            </a:r>
-            <a:r>
-              <a:rPr lang="nb-NO">
-                <a:hlinkClick r:id="rId7"/>
-              </a:rPr>
-              <a:t>projeksjon.no</a:t>
+              <a:t>http://projeksjon.no</a:t>
             </a:r>
             <a:r>
               <a:rPr lang="nb-NO" smtClean="0">

</xml_diff>